<commit_message>
Update results figure, add methods section and results section
</commit_message>
<xml_diff>
--- a/flowchart.pptx
+++ b/flowchart.pptx
@@ -263,7 +263,7 @@
           <a:p>
             <a:fld id="{DABF3190-F1C2-4ADC-8A47-12288D0DF403}" type="datetimeFigureOut">
               <a:rPr lang="nl-NL" smtClean="0"/>
-              <a:t>17-8-2021</a:t>
+              <a:t>7-9-2021</a:t>
             </a:fld>
             <a:endParaRPr lang="nl-NL"/>
           </a:p>
@@ -463,7 +463,7 @@
           <a:p>
             <a:fld id="{DABF3190-F1C2-4ADC-8A47-12288D0DF403}" type="datetimeFigureOut">
               <a:rPr lang="nl-NL" smtClean="0"/>
-              <a:t>17-8-2021</a:t>
+              <a:t>7-9-2021</a:t>
             </a:fld>
             <a:endParaRPr lang="nl-NL"/>
           </a:p>
@@ -673,7 +673,7 @@
           <a:p>
             <a:fld id="{DABF3190-F1C2-4ADC-8A47-12288D0DF403}" type="datetimeFigureOut">
               <a:rPr lang="nl-NL" smtClean="0"/>
-              <a:t>17-8-2021</a:t>
+              <a:t>7-9-2021</a:t>
             </a:fld>
             <a:endParaRPr lang="nl-NL"/>
           </a:p>
@@ -873,7 +873,7 @@
           <a:p>
             <a:fld id="{DABF3190-F1C2-4ADC-8A47-12288D0DF403}" type="datetimeFigureOut">
               <a:rPr lang="nl-NL" smtClean="0"/>
-              <a:t>17-8-2021</a:t>
+              <a:t>7-9-2021</a:t>
             </a:fld>
             <a:endParaRPr lang="nl-NL"/>
           </a:p>
@@ -1149,7 +1149,7 @@
           <a:p>
             <a:fld id="{DABF3190-F1C2-4ADC-8A47-12288D0DF403}" type="datetimeFigureOut">
               <a:rPr lang="nl-NL" smtClean="0"/>
-              <a:t>17-8-2021</a:t>
+              <a:t>7-9-2021</a:t>
             </a:fld>
             <a:endParaRPr lang="nl-NL"/>
           </a:p>
@@ -1417,7 +1417,7 @@
           <a:p>
             <a:fld id="{DABF3190-F1C2-4ADC-8A47-12288D0DF403}" type="datetimeFigureOut">
               <a:rPr lang="nl-NL" smtClean="0"/>
-              <a:t>17-8-2021</a:t>
+              <a:t>7-9-2021</a:t>
             </a:fld>
             <a:endParaRPr lang="nl-NL"/>
           </a:p>
@@ -1832,7 +1832,7 @@
           <a:p>
             <a:fld id="{DABF3190-F1C2-4ADC-8A47-12288D0DF403}" type="datetimeFigureOut">
               <a:rPr lang="nl-NL" smtClean="0"/>
-              <a:t>17-8-2021</a:t>
+              <a:t>7-9-2021</a:t>
             </a:fld>
             <a:endParaRPr lang="nl-NL"/>
           </a:p>
@@ -1974,7 +1974,7 @@
           <a:p>
             <a:fld id="{DABF3190-F1C2-4ADC-8A47-12288D0DF403}" type="datetimeFigureOut">
               <a:rPr lang="nl-NL" smtClean="0"/>
-              <a:t>17-8-2021</a:t>
+              <a:t>7-9-2021</a:t>
             </a:fld>
             <a:endParaRPr lang="nl-NL"/>
           </a:p>
@@ -2087,7 +2087,7 @@
           <a:p>
             <a:fld id="{DABF3190-F1C2-4ADC-8A47-12288D0DF403}" type="datetimeFigureOut">
               <a:rPr lang="nl-NL" smtClean="0"/>
-              <a:t>17-8-2021</a:t>
+              <a:t>7-9-2021</a:t>
             </a:fld>
             <a:endParaRPr lang="nl-NL"/>
           </a:p>
@@ -2400,7 +2400,7 @@
           <a:p>
             <a:fld id="{DABF3190-F1C2-4ADC-8A47-12288D0DF403}" type="datetimeFigureOut">
               <a:rPr lang="nl-NL" smtClean="0"/>
-              <a:t>17-8-2021</a:t>
+              <a:t>7-9-2021</a:t>
             </a:fld>
             <a:endParaRPr lang="nl-NL"/>
           </a:p>
@@ -2689,7 +2689,7 @@
           <a:p>
             <a:fld id="{DABF3190-F1C2-4ADC-8A47-12288D0DF403}" type="datetimeFigureOut">
               <a:rPr lang="nl-NL" smtClean="0"/>
-              <a:t>17-8-2021</a:t>
+              <a:t>7-9-2021</a:t>
             </a:fld>
             <a:endParaRPr lang="nl-NL"/>
           </a:p>
@@ -2932,7 +2932,7 @@
           <a:p>
             <a:fld id="{DABF3190-F1C2-4ADC-8A47-12288D0DF403}" type="datetimeFigureOut">
               <a:rPr lang="nl-NL" smtClean="0"/>
-              <a:t>17-8-2021</a:t>
+              <a:t>7-9-2021</a:t>
             </a:fld>
             <a:endParaRPr lang="nl-NL"/>
           </a:p>
@@ -6189,7 +6189,7 @@
         </p:nvSpPr>
         <p:spPr>
           <a:xfrm>
-            <a:off x="2223895" y="894837"/>
+            <a:off x="479934" y="593176"/>
             <a:ext cx="1677879" cy="585926"/>
           </a:xfrm>
           <a:prstGeom prst="rect">
@@ -6227,7 +6227,7 @@
                 <a:solidFill>
                   <a:schemeClr val="tx1"/>
                 </a:solidFill>
-                <a:latin typeface="Times New Roman" panose="02020603050405020304" pitchFamily="18" charset="0"/>
+                <a:latin typeface="+mj-lt"/>
                 <a:cs typeface="Times New Roman" panose="02020603050405020304" pitchFamily="18" charset="0"/>
               </a:rPr>
               <a:t>Manual selection</a:t>
@@ -6240,7 +6240,7 @@
                 <a:solidFill>
                   <a:schemeClr val="tx1"/>
                 </a:solidFill>
-                <a:latin typeface="Times New Roman" panose="02020603050405020304" pitchFamily="18" charset="0"/>
+                <a:latin typeface="+mj-lt"/>
                 <a:cs typeface="Times New Roman" panose="02020603050405020304" pitchFamily="18" charset="0"/>
               </a:rPr>
               <a:t>(n = 15)</a:t>
@@ -6249,7 +6249,7 @@
               <a:solidFill>
                 <a:schemeClr val="tx1"/>
               </a:solidFill>
-              <a:latin typeface="Times New Roman" panose="02020603050405020304" pitchFamily="18" charset="0"/>
+              <a:latin typeface="+mj-lt"/>
               <a:cs typeface="Times New Roman" panose="02020603050405020304" pitchFamily="18" charset="0"/>
             </a:endParaRPr>
           </a:p>
@@ -6269,7 +6269,7 @@
         </p:nvSpPr>
         <p:spPr>
           <a:xfrm>
-            <a:off x="6372549" y="890331"/>
+            <a:off x="4628588" y="588670"/>
             <a:ext cx="1677879" cy="585926"/>
           </a:xfrm>
           <a:prstGeom prst="rect">
@@ -6307,7 +6307,7 @@
                 <a:solidFill>
                   <a:schemeClr val="tx1"/>
                 </a:solidFill>
-                <a:latin typeface="Times New Roman" panose="02020603050405020304" pitchFamily="18" charset="0"/>
+                <a:latin typeface="+mj-lt"/>
                 <a:cs typeface="Times New Roman" panose="02020603050405020304" pitchFamily="18" charset="0"/>
               </a:rPr>
               <a:t>ArXiv</a:t>
@@ -6320,7 +6320,7 @@
                 <a:solidFill>
                   <a:schemeClr val="tx1"/>
                 </a:solidFill>
-                <a:latin typeface="Times New Roman" panose="02020603050405020304" pitchFamily="18" charset="0"/>
+                <a:latin typeface="+mj-lt"/>
                 <a:cs typeface="Times New Roman" panose="02020603050405020304" pitchFamily="18" charset="0"/>
               </a:rPr>
               <a:t>(n = 847)</a:t>
@@ -6329,7 +6329,7 @@
               <a:solidFill>
                 <a:schemeClr val="tx1"/>
               </a:solidFill>
-              <a:latin typeface="Times New Roman" panose="02020603050405020304" pitchFamily="18" charset="0"/>
+              <a:latin typeface="+mj-lt"/>
               <a:cs typeface="Times New Roman" panose="02020603050405020304" pitchFamily="18" charset="0"/>
             </a:endParaRPr>
           </a:p>
@@ -6349,7 +6349,7 @@
         </p:nvSpPr>
         <p:spPr>
           <a:xfrm>
-            <a:off x="4280463" y="890331"/>
+            <a:off x="2536502" y="588670"/>
             <a:ext cx="1677879" cy="585926"/>
           </a:xfrm>
           <a:prstGeom prst="rect">
@@ -6387,7 +6387,7 @@
                 <a:solidFill>
                   <a:schemeClr val="tx1"/>
                 </a:solidFill>
-                <a:latin typeface="Times New Roman" panose="02020603050405020304" pitchFamily="18" charset="0"/>
+                <a:latin typeface="+mj-lt"/>
                 <a:cs typeface="Times New Roman" panose="02020603050405020304" pitchFamily="18" charset="0"/>
               </a:rPr>
               <a:t>PubMed</a:t>
@@ -6400,7 +6400,7 @@
                 <a:solidFill>
                   <a:schemeClr val="tx1"/>
                 </a:solidFill>
-                <a:latin typeface="Times New Roman" panose="02020603050405020304" pitchFamily="18" charset="0"/>
+                <a:latin typeface="+mj-lt"/>
                 <a:cs typeface="Times New Roman" panose="02020603050405020304" pitchFamily="18" charset="0"/>
               </a:rPr>
               <a:t>(n = 2,568) </a:t>
@@ -6409,7 +6409,7 @@
               <a:solidFill>
                 <a:schemeClr val="tx1"/>
               </a:solidFill>
-              <a:latin typeface="Times New Roman" panose="02020603050405020304" pitchFamily="18" charset="0"/>
+              <a:latin typeface="+mj-lt"/>
               <a:cs typeface="Times New Roman" panose="02020603050405020304" pitchFamily="18" charset="0"/>
             </a:endParaRPr>
           </a:p>
@@ -6429,7 +6429,7 @@
         </p:nvSpPr>
         <p:spPr>
           <a:xfrm>
-            <a:off x="6372548" y="2404630"/>
+            <a:off x="4628587" y="2102969"/>
             <a:ext cx="1677879" cy="585926"/>
           </a:xfrm>
           <a:prstGeom prst="rect">
@@ -6467,7 +6467,7 @@
                 <a:solidFill>
                   <a:schemeClr val="tx1"/>
                 </a:solidFill>
-                <a:latin typeface="Times New Roman" panose="02020603050405020304" pitchFamily="18" charset="0"/>
+                <a:latin typeface="+mj-lt"/>
                 <a:cs typeface="Times New Roman" panose="02020603050405020304" pitchFamily="18" charset="0"/>
               </a:rPr>
               <a:t>Duplicates removed</a:t>
@@ -6480,7 +6480,7 @@
                 <a:solidFill>
                   <a:schemeClr val="tx1"/>
                 </a:solidFill>
-                <a:latin typeface="Times New Roman" panose="02020603050405020304" pitchFamily="18" charset="0"/>
+                <a:latin typeface="+mj-lt"/>
                 <a:cs typeface="Times New Roman" panose="02020603050405020304" pitchFamily="18" charset="0"/>
               </a:rPr>
               <a:t>(n = 155)</a:t>
@@ -6489,7 +6489,7 @@
               <a:solidFill>
                 <a:schemeClr val="tx1"/>
               </a:solidFill>
-              <a:latin typeface="Times New Roman" panose="02020603050405020304" pitchFamily="18" charset="0"/>
+              <a:latin typeface="+mj-lt"/>
               <a:cs typeface="Times New Roman" panose="02020603050405020304" pitchFamily="18" charset="0"/>
             </a:endParaRPr>
           </a:p>
@@ -6509,7 +6509,7 @@
         </p:nvSpPr>
         <p:spPr>
           <a:xfrm>
-            <a:off x="4287204" y="5089974"/>
+            <a:off x="2543243" y="4788313"/>
             <a:ext cx="1677879" cy="585926"/>
           </a:xfrm>
           <a:prstGeom prst="rect">
@@ -6547,7 +6547,7 @@
                 <a:solidFill>
                   <a:schemeClr val="tx1"/>
                 </a:solidFill>
-                <a:latin typeface="Times New Roman" panose="02020603050405020304" pitchFamily="18" charset="0"/>
+                <a:latin typeface="+mj-lt"/>
                 <a:cs typeface="Times New Roman" panose="02020603050405020304" pitchFamily="18" charset="0"/>
               </a:rPr>
               <a:t>Full article screened</a:t>
@@ -6560,7 +6560,7 @@
                 <a:solidFill>
                   <a:schemeClr val="tx1"/>
                 </a:solidFill>
-                <a:latin typeface="Times New Roman" panose="02020603050405020304" pitchFamily="18" charset="0"/>
+                <a:latin typeface="+mj-lt"/>
                 <a:cs typeface="Times New Roman" panose="02020603050405020304" pitchFamily="18" charset="0"/>
               </a:rPr>
               <a:t>(n = 122)</a:t>
@@ -6569,7 +6569,7 @@
               <a:solidFill>
                 <a:schemeClr val="tx1"/>
               </a:solidFill>
-              <a:latin typeface="Times New Roman" panose="02020603050405020304" pitchFamily="18" charset="0"/>
+              <a:latin typeface="+mj-lt"/>
               <a:cs typeface="Times New Roman" panose="02020603050405020304" pitchFamily="18" charset="0"/>
             </a:endParaRPr>
           </a:p>
@@ -6589,7 +6589,7 @@
         </p:nvSpPr>
         <p:spPr>
           <a:xfrm>
-            <a:off x="4280464" y="6154524"/>
+            <a:off x="2536503" y="5852863"/>
             <a:ext cx="1677879" cy="585926"/>
           </a:xfrm>
           <a:prstGeom prst="rect">
@@ -6627,7 +6627,7 @@
                 <a:solidFill>
                   <a:schemeClr val="tx1"/>
                 </a:solidFill>
-                <a:latin typeface="Times New Roman" panose="02020603050405020304" pitchFamily="18" charset="0"/>
+                <a:latin typeface="+mj-lt"/>
                 <a:cs typeface="Times New Roman" panose="02020603050405020304" pitchFamily="18" charset="0"/>
               </a:rPr>
               <a:t>Included in review</a:t>
@@ -6640,7 +6640,7 @@
                 <a:solidFill>
                   <a:schemeClr val="tx1"/>
                 </a:solidFill>
-                <a:latin typeface="Times New Roman" panose="02020603050405020304" pitchFamily="18" charset="0"/>
+                <a:latin typeface="+mj-lt"/>
                 <a:cs typeface="Times New Roman" panose="02020603050405020304" pitchFamily="18" charset="0"/>
               </a:rPr>
               <a:t>(n = 64)</a:t>
@@ -6649,7 +6649,7 @@
               <a:solidFill>
                 <a:schemeClr val="tx1"/>
               </a:solidFill>
-              <a:latin typeface="Times New Roman" panose="02020603050405020304" pitchFamily="18" charset="0"/>
+              <a:latin typeface="+mj-lt"/>
               <a:cs typeface="Times New Roman" panose="02020603050405020304" pitchFamily="18" charset="0"/>
             </a:endParaRPr>
           </a:p>
@@ -6669,7 +6669,7 @@
         </p:nvSpPr>
         <p:spPr>
           <a:xfrm>
-            <a:off x="6386028" y="4516446"/>
+            <a:off x="4642067" y="4214785"/>
             <a:ext cx="1677879" cy="585926"/>
           </a:xfrm>
           <a:prstGeom prst="rect">
@@ -6707,7 +6707,7 @@
                 <a:solidFill>
                   <a:schemeClr val="tx1"/>
                 </a:solidFill>
-                <a:latin typeface="Times New Roman" panose="02020603050405020304" pitchFamily="18" charset="0"/>
+                <a:latin typeface="+mj-lt"/>
                 <a:cs typeface="Times New Roman" panose="02020603050405020304" pitchFamily="18" charset="0"/>
               </a:rPr>
               <a:t>Abstract not relevant</a:t>
@@ -6720,7 +6720,7 @@
                 <a:solidFill>
                   <a:schemeClr val="tx1"/>
                 </a:solidFill>
-                <a:latin typeface="Times New Roman" panose="02020603050405020304" pitchFamily="18" charset="0"/>
+                <a:latin typeface="+mj-lt"/>
                 <a:cs typeface="Times New Roman" panose="02020603050405020304" pitchFamily="18" charset="0"/>
               </a:rPr>
               <a:t>(n = 262)</a:t>
@@ -6729,7 +6729,7 @@
               <a:solidFill>
                 <a:schemeClr val="tx1"/>
               </a:solidFill>
-              <a:latin typeface="Times New Roman" panose="02020603050405020304" pitchFamily="18" charset="0"/>
+              <a:latin typeface="+mj-lt"/>
               <a:cs typeface="Times New Roman" panose="02020603050405020304" pitchFamily="18" charset="0"/>
             </a:endParaRPr>
           </a:p>
@@ -6749,7 +6749,7 @@
         </p:nvSpPr>
         <p:spPr>
           <a:xfrm>
-            <a:off x="4298221" y="4021465"/>
+            <a:off x="2554260" y="3719804"/>
             <a:ext cx="1677879" cy="585926"/>
           </a:xfrm>
           <a:prstGeom prst="rect">
@@ -6787,7 +6787,7 @@
                 <a:solidFill>
                   <a:schemeClr val="tx1"/>
                 </a:solidFill>
-                <a:latin typeface="Times New Roman" panose="02020603050405020304" pitchFamily="18" charset="0"/>
+                <a:latin typeface="+mj-lt"/>
                 <a:cs typeface="Times New Roman" panose="02020603050405020304" pitchFamily="18" charset="0"/>
               </a:rPr>
               <a:t>Abstract screened</a:t>
@@ -6800,7 +6800,7 @@
                 <a:solidFill>
                   <a:schemeClr val="tx1"/>
                 </a:solidFill>
-                <a:latin typeface="Times New Roman" panose="02020603050405020304" pitchFamily="18" charset="0"/>
+                <a:latin typeface="+mj-lt"/>
                 <a:cs typeface="Times New Roman" panose="02020603050405020304" pitchFamily="18" charset="0"/>
               </a:rPr>
               <a:t>(n = 384)</a:t>
@@ -6809,7 +6809,7 @@
               <a:solidFill>
                 <a:schemeClr val="tx1"/>
               </a:solidFill>
-              <a:latin typeface="Times New Roman" panose="02020603050405020304" pitchFamily="18" charset="0"/>
+              <a:latin typeface="+mj-lt"/>
               <a:cs typeface="Times New Roman" panose="02020603050405020304" pitchFamily="18" charset="0"/>
             </a:endParaRPr>
           </a:p>
@@ -6833,8 +6833,8 @@
         </p:nvCxnSpPr>
         <p:spPr>
           <a:xfrm>
-            <a:off x="5119404" y="2478953"/>
-            <a:ext cx="6742" cy="483430"/>
+            <a:off x="3375443" y="2177292"/>
+            <a:ext cx="24498" cy="484918"/>
           </a:xfrm>
           <a:prstGeom prst="straightConnector1">
             <a:avLst/>
@@ -6878,7 +6878,7 @@
         </p:nvCxnSpPr>
         <p:spPr>
           <a:xfrm>
-            <a:off x="5137161" y="2684222"/>
+            <a:off x="3393200" y="2382561"/>
             <a:ext cx="1235387" cy="13371"/>
           </a:xfrm>
           <a:prstGeom prst="straightConnector1">
@@ -6924,7 +6924,7 @@
         </p:nvCxnSpPr>
         <p:spPr>
           <a:xfrm flipH="1">
-            <a:off x="3042820" y="1480763"/>
+            <a:off x="1298859" y="1179102"/>
             <a:ext cx="20015" cy="2287674"/>
           </a:xfrm>
           <a:prstGeom prst="straightConnector1">
@@ -6971,7 +6971,7 @@
         </p:nvSpPr>
         <p:spPr>
           <a:xfrm>
-            <a:off x="4280464" y="1893027"/>
+            <a:off x="2536503" y="1591366"/>
             <a:ext cx="1677879" cy="585926"/>
           </a:xfrm>
           <a:prstGeom prst="rect">
@@ -7009,10 +7009,10 @@
                 <a:solidFill>
                   <a:schemeClr val="tx1"/>
                 </a:solidFill>
-                <a:latin typeface="Times New Roman" panose="02020603050405020304" pitchFamily="18" charset="0"/>
+                <a:latin typeface="+mj-lt"/>
                 <a:cs typeface="Times New Roman" panose="02020603050405020304" pitchFamily="18" charset="0"/>
               </a:rPr>
-              <a:t>Articles identified</a:t>
+              <a:t>Publications identified</a:t>
             </a:r>
           </a:p>
           <a:p>
@@ -7022,7 +7022,7 @@
                 <a:solidFill>
                   <a:schemeClr val="tx1"/>
                 </a:solidFill>
-                <a:latin typeface="Times New Roman" panose="02020603050405020304" pitchFamily="18" charset="0"/>
+                <a:latin typeface="+mj-lt"/>
                 <a:cs typeface="Times New Roman" panose="02020603050405020304" pitchFamily="18" charset="0"/>
               </a:rPr>
               <a:t>(n = 3,430) </a:t>
@@ -7031,7 +7031,7 @@
               <a:solidFill>
                 <a:schemeClr val="tx1"/>
               </a:solidFill>
-              <a:latin typeface="Times New Roman" panose="02020603050405020304" pitchFamily="18" charset="0"/>
+              <a:latin typeface="+mj-lt"/>
               <a:cs typeface="Times New Roman" panose="02020603050405020304" pitchFamily="18" charset="0"/>
             </a:endParaRPr>
           </a:p>
@@ -7051,7 +7051,7 @@
         </p:nvSpPr>
         <p:spPr>
           <a:xfrm>
-            <a:off x="6386028" y="3475474"/>
+            <a:off x="4642067" y="3173813"/>
             <a:ext cx="1677879" cy="585926"/>
           </a:xfrm>
           <a:prstGeom prst="rect">
@@ -7089,10 +7089,10 @@
                 <a:solidFill>
                   <a:schemeClr val="tx1"/>
                 </a:solidFill>
-                <a:latin typeface="Times New Roman" panose="02020603050405020304" pitchFamily="18" charset="0"/>
+                <a:latin typeface="+mj-lt"/>
                 <a:cs typeface="Times New Roman" panose="02020603050405020304" pitchFamily="18" charset="0"/>
               </a:rPr>
-              <a:t>Abstract not screened</a:t>
+              <a:t>Abstract not selected</a:t>
             </a:r>
           </a:p>
           <a:p>
@@ -7102,7 +7102,7 @@
                 <a:solidFill>
                   <a:schemeClr val="tx1"/>
                 </a:solidFill>
-                <a:latin typeface="Times New Roman" panose="02020603050405020304" pitchFamily="18" charset="0"/>
+                <a:latin typeface="+mj-lt"/>
                 <a:cs typeface="Times New Roman" panose="02020603050405020304" pitchFamily="18" charset="0"/>
               </a:rPr>
               <a:t>(n = 2,891)</a:t>
@@ -7111,7 +7111,7 @@
               <a:solidFill>
                 <a:schemeClr val="tx1"/>
               </a:solidFill>
-              <a:latin typeface="Times New Roman" panose="02020603050405020304" pitchFamily="18" charset="0"/>
+              <a:latin typeface="+mj-lt"/>
               <a:cs typeface="Times New Roman" panose="02020603050405020304" pitchFamily="18" charset="0"/>
             </a:endParaRPr>
           </a:p>
@@ -7131,7 +7131,7 @@
         </p:nvSpPr>
         <p:spPr>
           <a:xfrm>
-            <a:off x="4287206" y="2962383"/>
+            <a:off x="2561001" y="2662210"/>
             <a:ext cx="1677879" cy="585926"/>
           </a:xfrm>
           <a:prstGeom prst="rect">
@@ -7169,10 +7169,10 @@
                 <a:solidFill>
                   <a:schemeClr val="tx1"/>
                 </a:solidFill>
-                <a:latin typeface="Times New Roman" panose="02020603050405020304" pitchFamily="18" charset="0"/>
+                <a:latin typeface="+mj-lt"/>
                 <a:cs typeface="Times New Roman" panose="02020603050405020304" pitchFamily="18" charset="0"/>
               </a:rPr>
-              <a:t>AI assisted screening</a:t>
+              <a:t>Screened by ASReview</a:t>
             </a:r>
           </a:p>
           <a:p>
@@ -7182,7 +7182,7 @@
                 <a:solidFill>
                   <a:schemeClr val="tx1"/>
                 </a:solidFill>
-                <a:latin typeface="Times New Roman" panose="02020603050405020304" pitchFamily="18" charset="0"/>
+                <a:latin typeface="+mj-lt"/>
                 <a:cs typeface="Times New Roman" panose="02020603050405020304" pitchFamily="18" charset="0"/>
               </a:rPr>
               <a:t>(n = 3,275)</a:t>
@@ -7191,7 +7191,7 @@
               <a:solidFill>
                 <a:schemeClr val="tx1"/>
               </a:solidFill>
-              <a:latin typeface="Times New Roman" panose="02020603050405020304" pitchFamily="18" charset="0"/>
+              <a:latin typeface="+mj-lt"/>
               <a:cs typeface="Times New Roman" panose="02020603050405020304" pitchFamily="18" charset="0"/>
             </a:endParaRPr>
           </a:p>
@@ -7215,7 +7215,7 @@
         </p:nvCxnSpPr>
         <p:spPr>
           <a:xfrm flipH="1">
-            <a:off x="5126144" y="4607391"/>
+            <a:off x="3382183" y="4305730"/>
             <a:ext cx="11017" cy="482583"/>
           </a:xfrm>
           <a:prstGeom prst="straightConnector1">
@@ -7259,7 +7259,7 @@
         </p:nvCxnSpPr>
         <p:spPr>
           <a:xfrm flipH="1">
-            <a:off x="3042820" y="3768437"/>
+            <a:off x="1298859" y="3466776"/>
             <a:ext cx="2023286" cy="0"/>
           </a:xfrm>
           <a:prstGeom prst="straightConnector1">
@@ -7309,7 +7309,7 @@
         </p:nvCxnSpPr>
         <p:spPr>
           <a:xfrm>
-            <a:off x="5143901" y="3768437"/>
+            <a:off x="3399940" y="3466776"/>
             <a:ext cx="1242127" cy="0"/>
           </a:xfrm>
           <a:prstGeom prst="straightConnector1">
@@ -7355,9 +7355,9 @@
           <p:nvPr/>
         </p:nvCxnSpPr>
         <p:spPr>
-          <a:xfrm>
-            <a:off x="5126146" y="3548309"/>
-            <a:ext cx="11015" cy="473156"/>
+          <a:xfrm flipH="1">
+            <a:off x="3393200" y="3248136"/>
+            <a:ext cx="6741" cy="471668"/>
           </a:xfrm>
           <a:prstGeom prst="straightConnector1">
             <a:avLst/>
@@ -7401,7 +7401,7 @@
         </p:nvCxnSpPr>
         <p:spPr>
           <a:xfrm>
-            <a:off x="5140531" y="4809409"/>
+            <a:off x="3396570" y="4507748"/>
             <a:ext cx="1245497" cy="0"/>
           </a:xfrm>
           <a:prstGeom prst="straightConnector1">
@@ -7446,7 +7446,7 @@
         </p:nvCxnSpPr>
         <p:spPr>
           <a:xfrm flipH="1">
-            <a:off x="5121531" y="5692663"/>
+            <a:off x="3377570" y="5391002"/>
             <a:ext cx="11017" cy="482583"/>
           </a:xfrm>
           <a:prstGeom prst="straightConnector1">
@@ -7491,7 +7491,7 @@
         </p:nvCxnSpPr>
         <p:spPr>
           <a:xfrm>
-            <a:off x="5140531" y="5907296"/>
+            <a:off x="3396570" y="5605635"/>
             <a:ext cx="1232017" cy="0"/>
           </a:xfrm>
           <a:prstGeom prst="straightConnector1">
@@ -7534,7 +7534,7 @@
         </p:nvSpPr>
         <p:spPr>
           <a:xfrm>
-            <a:off x="6372548" y="5614333"/>
+            <a:off x="4628587" y="5312672"/>
             <a:ext cx="1677879" cy="585926"/>
           </a:xfrm>
           <a:prstGeom prst="rect">
@@ -7572,7 +7572,7 @@
                 <a:solidFill>
                   <a:schemeClr val="tx1"/>
                 </a:solidFill>
-                <a:latin typeface="Times New Roman" panose="02020603050405020304" pitchFamily="18" charset="0"/>
+                <a:latin typeface="+mj-lt"/>
                 <a:cs typeface="Times New Roman" panose="02020603050405020304" pitchFamily="18" charset="0"/>
               </a:rPr>
               <a:t>Full article not relevant</a:t>
@@ -7585,7 +7585,7 @@
                 <a:solidFill>
                   <a:schemeClr val="tx1"/>
                 </a:solidFill>
-                <a:latin typeface="Times New Roman" panose="02020603050405020304" pitchFamily="18" charset="0"/>
+                <a:latin typeface="+mj-lt"/>
                 <a:cs typeface="Times New Roman" panose="02020603050405020304" pitchFamily="18" charset="0"/>
               </a:rPr>
               <a:t>(n = 262)</a:t>
@@ -7594,7 +7594,7 @@
               <a:solidFill>
                 <a:schemeClr val="tx1"/>
               </a:solidFill>
-              <a:latin typeface="Times New Roman" panose="02020603050405020304" pitchFamily="18" charset="0"/>
+              <a:latin typeface="+mj-lt"/>
               <a:cs typeface="Times New Roman" panose="02020603050405020304" pitchFamily="18" charset="0"/>
             </a:endParaRPr>
           </a:p>
@@ -7618,7 +7618,7 @@
         </p:nvCxnSpPr>
         <p:spPr>
           <a:xfrm>
-            <a:off x="5119403" y="1476257"/>
+            <a:off x="3375442" y="1174596"/>
             <a:ext cx="1" cy="416770"/>
           </a:xfrm>
           <a:prstGeom prst="straightConnector1">
@@ -7662,7 +7662,7 @@
         </p:nvCxnSpPr>
         <p:spPr>
           <a:xfrm>
-            <a:off x="3069575" y="1669019"/>
+            <a:off x="1325614" y="1367358"/>
             <a:ext cx="4141913" cy="0"/>
           </a:xfrm>
           <a:prstGeom prst="straightConnector1">
@@ -7709,7 +7709,7 @@
         </p:nvCxnSpPr>
         <p:spPr>
           <a:xfrm flipV="1">
-            <a:off x="7211488" y="1476257"/>
+            <a:off x="5467527" y="1174596"/>
             <a:ext cx="1" cy="208385"/>
           </a:xfrm>
           <a:prstGeom prst="straightConnector1">
@@ -7755,7 +7755,7 @@
         </p:nvCxnSpPr>
         <p:spPr>
           <a:xfrm flipV="1">
-            <a:off x="3069575" y="1499959"/>
+            <a:off x="1325614" y="1198298"/>
             <a:ext cx="1" cy="177096"/>
           </a:xfrm>
           <a:prstGeom prst="straightConnector1">

</xml_diff>